<commit_message>
Added some more logos and improved the landing page
</commit_message>
<xml_diff>
--- a/private/logos_und_grafiken.pptx
+++ b/private/logos_und_grafiken.pptx
@@ -6,6 +6,9 @@
   </p:sldMasterIdLst>
   <p:sldIdLst>
     <p:sldId id="261" r:id="rId2"/>
+    <p:sldId id="262" r:id="rId3"/>
+    <p:sldId id="263" r:id="rId4"/>
+    <p:sldId id="264" r:id="rId5"/>
   </p:sldIdLst>
   <p:sldSz cx="9144000" cy="6858000" type="screen4x3"/>
   <p:notesSz cx="6858000" cy="9144000"/>
@@ -288,7 +291,7 @@
           <a:p>
             <a:fld id="{A5C5823E-21D6-FA4F-8EFB-1698D4BBABA1}" type="datetimeFigureOut">
               <a:rPr lang="de-DE" smtClean="0"/>
-              <a:t>28.07.15</a:t>
+              <a:t>29.07.15</a:t>
             </a:fld>
             <a:endParaRPr lang="de-DE"/>
           </a:p>
@@ -458,7 +461,7 @@
           <a:p>
             <a:fld id="{A5C5823E-21D6-FA4F-8EFB-1698D4BBABA1}" type="datetimeFigureOut">
               <a:rPr lang="de-DE" smtClean="0"/>
-              <a:t>28.07.15</a:t>
+              <a:t>29.07.15</a:t>
             </a:fld>
             <a:endParaRPr lang="de-DE"/>
           </a:p>
@@ -638,7 +641,7 @@
           <a:p>
             <a:fld id="{A5C5823E-21D6-FA4F-8EFB-1698D4BBABA1}" type="datetimeFigureOut">
               <a:rPr lang="de-DE" smtClean="0"/>
-              <a:t>28.07.15</a:t>
+              <a:t>29.07.15</a:t>
             </a:fld>
             <a:endParaRPr lang="de-DE"/>
           </a:p>
@@ -808,7 +811,7 @@
           <a:p>
             <a:fld id="{A5C5823E-21D6-FA4F-8EFB-1698D4BBABA1}" type="datetimeFigureOut">
               <a:rPr lang="de-DE" smtClean="0"/>
-              <a:t>28.07.15</a:t>
+              <a:t>29.07.15</a:t>
             </a:fld>
             <a:endParaRPr lang="de-DE"/>
           </a:p>
@@ -1054,7 +1057,7 @@
           <a:p>
             <a:fld id="{A5C5823E-21D6-FA4F-8EFB-1698D4BBABA1}" type="datetimeFigureOut">
               <a:rPr lang="de-DE" smtClean="0"/>
-              <a:t>28.07.15</a:t>
+              <a:t>29.07.15</a:t>
             </a:fld>
             <a:endParaRPr lang="de-DE"/>
           </a:p>
@@ -1342,7 +1345,7 @@
           <a:p>
             <a:fld id="{A5C5823E-21D6-FA4F-8EFB-1698D4BBABA1}" type="datetimeFigureOut">
               <a:rPr lang="de-DE" smtClean="0"/>
-              <a:t>28.07.15</a:t>
+              <a:t>29.07.15</a:t>
             </a:fld>
             <a:endParaRPr lang="de-DE"/>
           </a:p>
@@ -1764,7 +1767,7 @@
           <a:p>
             <a:fld id="{A5C5823E-21D6-FA4F-8EFB-1698D4BBABA1}" type="datetimeFigureOut">
               <a:rPr lang="de-DE" smtClean="0"/>
-              <a:t>28.07.15</a:t>
+              <a:t>29.07.15</a:t>
             </a:fld>
             <a:endParaRPr lang="de-DE"/>
           </a:p>
@@ -1882,7 +1885,7 @@
           <a:p>
             <a:fld id="{A5C5823E-21D6-FA4F-8EFB-1698D4BBABA1}" type="datetimeFigureOut">
               <a:rPr lang="de-DE" smtClean="0"/>
-              <a:t>28.07.15</a:t>
+              <a:t>29.07.15</a:t>
             </a:fld>
             <a:endParaRPr lang="de-DE"/>
           </a:p>
@@ -1977,7 +1980,7 @@
           <a:p>
             <a:fld id="{A5C5823E-21D6-FA4F-8EFB-1698D4BBABA1}" type="datetimeFigureOut">
               <a:rPr lang="de-DE" smtClean="0"/>
-              <a:t>28.07.15</a:t>
+              <a:t>29.07.15</a:t>
             </a:fld>
             <a:endParaRPr lang="de-DE"/>
           </a:p>
@@ -2254,7 +2257,7 @@
           <a:p>
             <a:fld id="{A5C5823E-21D6-FA4F-8EFB-1698D4BBABA1}" type="datetimeFigureOut">
               <a:rPr lang="de-DE" smtClean="0"/>
-              <a:t>28.07.15</a:t>
+              <a:t>29.07.15</a:t>
             </a:fld>
             <a:endParaRPr lang="de-DE"/>
           </a:p>
@@ -2507,7 +2510,7 @@
           <a:p>
             <a:fld id="{A5C5823E-21D6-FA4F-8EFB-1698D4BBABA1}" type="datetimeFigureOut">
               <a:rPr lang="de-DE" smtClean="0"/>
-              <a:t>28.07.15</a:t>
+              <a:t>29.07.15</a:t>
             </a:fld>
             <a:endParaRPr lang="de-DE"/>
           </a:p>
@@ -2720,7 +2723,7 @@
           <a:p>
             <a:fld id="{A5C5823E-21D6-FA4F-8EFB-1698D4BBABA1}" type="datetimeFigureOut">
               <a:rPr lang="de-DE" smtClean="0"/>
-              <a:t>28.07.15</a:t>
+              <a:t>29.07.15</a:t>
             </a:fld>
             <a:endParaRPr lang="de-DE"/>
           </a:p>
@@ -3409,6 +3412,913 @@
     <p:extLst>
       <p:ext uri="{BB962C8B-B14F-4D97-AF65-F5344CB8AC3E}">
         <p14:creationId xmlns:p14="http://schemas.microsoft.com/office/powerpoint/2010/main" val="191275691"/>
+      </p:ext>
+    </p:extLst>
+  </p:cSld>
+  <p:clrMapOvr>
+    <a:masterClrMapping/>
+  </p:clrMapOvr>
+  <p:timing>
+    <p:tnLst>
+      <p:par>
+        <p:cTn xmlns:p14="http://schemas.microsoft.com/office/powerpoint/2010/main" id="1" dur="indefinite" restart="never" nodeType="tmRoot"/>
+      </p:par>
+    </p:tnLst>
+  </p:timing>
+</p:sld>
+</file>
+
+<file path=ppt/slides/slide2.xml><?xml version="1.0" encoding="utf-8"?>
+<p:sld xmlns:a="http://schemas.openxmlformats.org/drawingml/2006/main" xmlns:r="http://schemas.openxmlformats.org/officeDocument/2006/relationships" xmlns:p="http://schemas.openxmlformats.org/presentationml/2006/main">
+  <p:cSld>
+    <p:spTree>
+      <p:nvGrpSpPr>
+        <p:cNvPr id="1" name=""/>
+        <p:cNvGrpSpPr/>
+        <p:nvPr/>
+      </p:nvGrpSpPr>
+      <p:grpSpPr>
+        <a:xfrm>
+          <a:off x="0" y="0"/>
+          <a:ext cx="0" cy="0"/>
+          <a:chOff x="0" y="0"/>
+          <a:chExt cx="0" cy="0"/>
+        </a:xfrm>
+      </p:grpSpPr>
+      <p:sp>
+        <p:nvSpPr>
+          <p:cNvPr id="5" name="Rechteck 4"/>
+          <p:cNvSpPr/>
+          <p:nvPr/>
+        </p:nvSpPr>
+        <p:spPr>
+          <a:xfrm>
+            <a:off x="4233" y="-4233"/>
+            <a:ext cx="9144000" cy="6857999"/>
+          </a:xfrm>
+          <a:prstGeom prst="rect">
+            <a:avLst/>
+          </a:prstGeom>
+          <a:solidFill>
+            <a:srgbClr val="333D47"/>
+          </a:solidFill>
+          <a:ln>
+            <a:noFill/>
+          </a:ln>
+        </p:spPr>
+        <p:style>
+          <a:lnRef idx="1">
+            <a:schemeClr val="accent1"/>
+          </a:lnRef>
+          <a:fillRef idx="3">
+            <a:schemeClr val="accent1"/>
+          </a:fillRef>
+          <a:effectRef idx="2">
+            <a:schemeClr val="accent1"/>
+          </a:effectRef>
+          <a:fontRef idx="minor">
+            <a:schemeClr val="lt1"/>
+          </a:fontRef>
+        </p:style>
+        <p:txBody>
+          <a:bodyPr rtlCol="0" anchor="ctr"/>
+          <a:lstStyle/>
+          <a:p>
+            <a:pPr algn="ctr"/>
+            <a:endParaRPr lang="de-DE" dirty="0"/>
+          </a:p>
+        </p:txBody>
+      </p:sp>
+      <p:grpSp>
+        <p:nvGrpSpPr>
+          <p:cNvPr id="2" name="Gruppierung 1"/>
+          <p:cNvGrpSpPr/>
+          <p:nvPr/>
+        </p:nvGrpSpPr>
+        <p:grpSpPr>
+          <a:xfrm>
+            <a:off x="1968665" y="1660969"/>
+            <a:ext cx="1355077" cy="1509792"/>
+            <a:chOff x="2248974" y="1436337"/>
+            <a:chExt cx="3371514" cy="3756455"/>
+          </a:xfrm>
+        </p:grpSpPr>
+        <p:sp>
+          <p:nvSpPr>
+            <p:cNvPr id="17" name="Gleichschenkliges Dreieck 16"/>
+            <p:cNvSpPr/>
+            <p:nvPr/>
+          </p:nvSpPr>
+          <p:spPr>
+            <a:xfrm rot="19815544">
+              <a:off x="3015709" y="1436337"/>
+              <a:ext cx="1778053" cy="1537984"/>
+            </a:xfrm>
+            <a:prstGeom prst="triangle">
+              <a:avLst>
+                <a:gd name="adj" fmla="val 49958"/>
+              </a:avLst>
+            </a:prstGeom>
+            <a:noFill/>
+            <a:ln w="19050" cmpd="sng">
+              <a:solidFill>
+                <a:srgbClr val="FFFFFF"/>
+              </a:solidFill>
+            </a:ln>
+          </p:spPr>
+          <p:style>
+            <a:lnRef idx="1">
+              <a:schemeClr val="accent1"/>
+            </a:lnRef>
+            <a:fillRef idx="3">
+              <a:schemeClr val="accent1"/>
+            </a:fillRef>
+            <a:effectRef idx="2">
+              <a:schemeClr val="accent1"/>
+            </a:effectRef>
+            <a:fontRef idx="minor">
+              <a:schemeClr val="lt1"/>
+            </a:fontRef>
+          </p:style>
+          <p:txBody>
+            <a:bodyPr rtlCol="0" anchor="ctr"/>
+            <a:lstStyle/>
+            <a:p>
+              <a:pPr algn="ctr"/>
+              <a:endParaRPr lang="de-DE"/>
+            </a:p>
+          </p:txBody>
+        </p:sp>
+        <p:sp>
+          <p:nvSpPr>
+            <p:cNvPr id="9" name="Parallelogramm 8"/>
+            <p:cNvSpPr/>
+            <p:nvPr/>
+          </p:nvSpPr>
+          <p:spPr>
+            <a:xfrm rot="19815425">
+              <a:off x="2958843" y="2991532"/>
+              <a:ext cx="2661645" cy="1543077"/>
+            </a:xfrm>
+            <a:prstGeom prst="parallelogram">
+              <a:avLst>
+                <a:gd name="adj" fmla="val 57065"/>
+              </a:avLst>
+            </a:prstGeom>
+            <a:noFill/>
+            <a:ln w="19050" cmpd="sng">
+              <a:solidFill>
+                <a:schemeClr val="bg1"/>
+              </a:solidFill>
+            </a:ln>
+          </p:spPr>
+          <p:style>
+            <a:lnRef idx="1">
+              <a:schemeClr val="accent1"/>
+            </a:lnRef>
+            <a:fillRef idx="3">
+              <a:schemeClr val="accent1"/>
+            </a:fillRef>
+            <a:effectRef idx="2">
+              <a:schemeClr val="accent1"/>
+            </a:effectRef>
+            <a:fontRef idx="minor">
+              <a:schemeClr val="lt1"/>
+            </a:fontRef>
+          </p:style>
+          <p:txBody>
+            <a:bodyPr rtlCol="0" anchor="ctr"/>
+            <a:lstStyle/>
+            <a:p>
+              <a:pPr algn="ctr"/>
+              <a:endParaRPr lang="de-DE"/>
+            </a:p>
+          </p:txBody>
+        </p:sp>
+        <p:sp>
+          <p:nvSpPr>
+            <p:cNvPr id="24" name="Gleichschenkliges Dreieck 23"/>
+            <p:cNvSpPr/>
+            <p:nvPr/>
+          </p:nvSpPr>
+          <p:spPr>
+            <a:xfrm rot="9018042">
+              <a:off x="2255324" y="1872714"/>
+              <a:ext cx="1762729" cy="1537984"/>
+            </a:xfrm>
+            <a:prstGeom prst="triangle">
+              <a:avLst>
+                <a:gd name="adj" fmla="val 49958"/>
+              </a:avLst>
+            </a:prstGeom>
+            <a:noFill/>
+            <a:ln w="19050" cmpd="sng">
+              <a:solidFill>
+                <a:srgbClr val="FFFFFF"/>
+              </a:solidFill>
+            </a:ln>
+          </p:spPr>
+          <p:style>
+            <a:lnRef idx="1">
+              <a:schemeClr val="accent1"/>
+            </a:lnRef>
+            <a:fillRef idx="3">
+              <a:schemeClr val="accent1"/>
+            </a:fillRef>
+            <a:effectRef idx="2">
+              <a:schemeClr val="accent1"/>
+            </a:effectRef>
+            <a:fontRef idx="minor">
+              <a:schemeClr val="lt1"/>
+            </a:fontRef>
+          </p:style>
+          <p:txBody>
+            <a:bodyPr rtlCol="0" anchor="ctr"/>
+            <a:lstStyle/>
+            <a:p>
+              <a:pPr algn="ctr"/>
+              <a:endParaRPr lang="de-DE"/>
+            </a:p>
+          </p:txBody>
+        </p:sp>
+        <p:sp>
+          <p:nvSpPr>
+            <p:cNvPr id="25" name="Gleichschenkliges Dreieck 24"/>
+            <p:cNvSpPr/>
+            <p:nvPr/>
+          </p:nvSpPr>
+          <p:spPr>
+            <a:xfrm rot="9018042">
+              <a:off x="2248974" y="3654808"/>
+              <a:ext cx="1762729" cy="1537984"/>
+            </a:xfrm>
+            <a:prstGeom prst="triangle">
+              <a:avLst>
+                <a:gd name="adj" fmla="val 49958"/>
+              </a:avLst>
+            </a:prstGeom>
+            <a:noFill/>
+            <a:ln w="19050" cmpd="sng">
+              <a:solidFill>
+                <a:srgbClr val="FFFFFF"/>
+              </a:solidFill>
+            </a:ln>
+          </p:spPr>
+          <p:style>
+            <a:lnRef idx="1">
+              <a:schemeClr val="accent1"/>
+            </a:lnRef>
+            <a:fillRef idx="3">
+              <a:schemeClr val="accent1"/>
+            </a:fillRef>
+            <a:effectRef idx="2">
+              <a:schemeClr val="accent1"/>
+            </a:effectRef>
+            <a:fontRef idx="minor">
+              <a:schemeClr val="lt1"/>
+            </a:fontRef>
+          </p:style>
+          <p:txBody>
+            <a:bodyPr rtlCol="0" anchor="ctr"/>
+            <a:lstStyle/>
+            <a:p>
+              <a:pPr algn="ctr"/>
+              <a:endParaRPr lang="de-DE"/>
+            </a:p>
+          </p:txBody>
+        </p:sp>
+      </p:grpSp>
+    </p:spTree>
+    <p:extLst>
+      <p:ext uri="{BB962C8B-B14F-4D97-AF65-F5344CB8AC3E}">
+        <p14:creationId xmlns:p14="http://schemas.microsoft.com/office/powerpoint/2010/main" val="1403245446"/>
+      </p:ext>
+    </p:extLst>
+  </p:cSld>
+  <p:clrMapOvr>
+    <a:masterClrMapping/>
+  </p:clrMapOvr>
+  <p:timing>
+    <p:tnLst>
+      <p:par>
+        <p:cTn xmlns:p14="http://schemas.microsoft.com/office/powerpoint/2010/main" id="1" dur="indefinite" restart="never" nodeType="tmRoot"/>
+      </p:par>
+    </p:tnLst>
+  </p:timing>
+</p:sld>
+</file>
+
+<file path=ppt/slides/slide3.xml><?xml version="1.0" encoding="utf-8"?>
+<p:sld xmlns:a="http://schemas.openxmlformats.org/drawingml/2006/main" xmlns:r="http://schemas.openxmlformats.org/officeDocument/2006/relationships" xmlns:p="http://schemas.openxmlformats.org/presentationml/2006/main">
+  <p:cSld>
+    <p:spTree>
+      <p:nvGrpSpPr>
+        <p:cNvPr id="1" name=""/>
+        <p:cNvGrpSpPr/>
+        <p:nvPr/>
+      </p:nvGrpSpPr>
+      <p:grpSpPr>
+        <a:xfrm>
+          <a:off x="0" y="0"/>
+          <a:ext cx="0" cy="0"/>
+          <a:chOff x="0" y="0"/>
+          <a:chExt cx="0" cy="0"/>
+        </a:xfrm>
+      </p:grpSpPr>
+      <p:sp>
+        <p:nvSpPr>
+          <p:cNvPr id="5" name="Rechteck 4"/>
+          <p:cNvSpPr/>
+          <p:nvPr/>
+        </p:nvSpPr>
+        <p:spPr>
+          <a:xfrm>
+            <a:off x="4233" y="-4233"/>
+            <a:ext cx="9144000" cy="6857999"/>
+          </a:xfrm>
+          <a:prstGeom prst="rect">
+            <a:avLst/>
+          </a:prstGeom>
+          <a:solidFill>
+            <a:srgbClr val="F3F3F4"/>
+          </a:solidFill>
+          <a:ln>
+            <a:noFill/>
+          </a:ln>
+        </p:spPr>
+        <p:style>
+          <a:lnRef idx="1">
+            <a:schemeClr val="accent1"/>
+          </a:lnRef>
+          <a:fillRef idx="3">
+            <a:schemeClr val="accent1"/>
+          </a:fillRef>
+          <a:effectRef idx="2">
+            <a:schemeClr val="accent1"/>
+          </a:effectRef>
+          <a:fontRef idx="minor">
+            <a:schemeClr val="lt1"/>
+          </a:fontRef>
+        </p:style>
+        <p:txBody>
+          <a:bodyPr rtlCol="0" anchor="ctr"/>
+          <a:lstStyle/>
+          <a:p>
+            <a:pPr algn="ctr"/>
+            <a:endParaRPr lang="de-DE" dirty="0"/>
+          </a:p>
+        </p:txBody>
+      </p:sp>
+      <p:grpSp>
+        <p:nvGrpSpPr>
+          <p:cNvPr id="8" name="Gruppierung 7"/>
+          <p:cNvGrpSpPr/>
+          <p:nvPr/>
+        </p:nvGrpSpPr>
+        <p:grpSpPr>
+          <a:xfrm>
+            <a:off x="1968665" y="1660969"/>
+            <a:ext cx="5299807" cy="1509792"/>
+            <a:chOff x="1454477" y="1660969"/>
+            <a:chExt cx="5299807" cy="1509792"/>
+          </a:xfrm>
+        </p:grpSpPr>
+        <p:sp>
+          <p:nvSpPr>
+            <p:cNvPr id="22" name="Textfeld 21"/>
+            <p:cNvSpPr txBox="1"/>
+            <p:nvPr/>
+          </p:nvSpPr>
+          <p:spPr>
+            <a:xfrm>
+              <a:off x="2690284" y="1892943"/>
+              <a:ext cx="4064000" cy="1015663"/>
+            </a:xfrm>
+            <a:prstGeom prst="rect">
+              <a:avLst/>
+            </a:prstGeom>
+            <a:noFill/>
+          </p:spPr>
+          <p:txBody>
+            <a:bodyPr wrap="square" rtlCol="0">
+              <a:spAutoFit/>
+            </a:bodyPr>
+            <a:lstStyle/>
+            <a:p>
+              <a:r>
+                <a:rPr lang="de-DE" sz="6000" dirty="0" smtClean="0">
+                  <a:solidFill>
+                    <a:srgbClr val="333D47"/>
+                  </a:solidFill>
+                  <a:latin typeface="Roboto Light"/>
+                  <a:cs typeface="Roboto Light"/>
+                </a:rPr>
+                <a:t>SIMPLY</a:t>
+              </a:r>
+              <a:r>
+                <a:rPr lang="de-DE" sz="6000" dirty="0" smtClean="0">
+                  <a:solidFill>
+                    <a:srgbClr val="3F80CD"/>
+                  </a:solidFill>
+                  <a:latin typeface="Roboto Light"/>
+                  <a:cs typeface="Roboto Light"/>
+                </a:rPr>
+                <a:t>FI</a:t>
+              </a:r>
+              <a:endParaRPr lang="de-DE" sz="6000" dirty="0">
+                <a:solidFill>
+                  <a:srgbClr val="3F80CD"/>
+                </a:solidFill>
+                <a:latin typeface="Roboto Light"/>
+                <a:cs typeface="Roboto Light"/>
+              </a:endParaRPr>
+            </a:p>
+          </p:txBody>
+        </p:sp>
+        <p:grpSp>
+          <p:nvGrpSpPr>
+            <p:cNvPr id="2" name="Gruppierung 1"/>
+            <p:cNvGrpSpPr/>
+            <p:nvPr/>
+          </p:nvGrpSpPr>
+          <p:grpSpPr>
+            <a:xfrm>
+              <a:off x="1454477" y="1660969"/>
+              <a:ext cx="1355077" cy="1509792"/>
+              <a:chOff x="2248974" y="1436337"/>
+              <a:chExt cx="3371514" cy="3756455"/>
+            </a:xfrm>
+          </p:grpSpPr>
+          <p:sp>
+            <p:nvSpPr>
+              <p:cNvPr id="17" name="Gleichschenkliges Dreieck 16"/>
+              <p:cNvSpPr/>
+              <p:nvPr/>
+            </p:nvSpPr>
+            <p:spPr>
+              <a:xfrm rot="19815544">
+                <a:off x="3015709" y="1436337"/>
+                <a:ext cx="1778053" cy="1537984"/>
+              </a:xfrm>
+              <a:prstGeom prst="triangle">
+                <a:avLst>
+                  <a:gd name="adj" fmla="val 49958"/>
+                </a:avLst>
+              </a:prstGeom>
+              <a:noFill/>
+              <a:ln w="19050" cmpd="sng">
+                <a:solidFill>
+                  <a:srgbClr val="333D47"/>
+                </a:solidFill>
+              </a:ln>
+            </p:spPr>
+            <p:style>
+              <a:lnRef idx="1">
+                <a:schemeClr val="accent1"/>
+              </a:lnRef>
+              <a:fillRef idx="3">
+                <a:schemeClr val="accent1"/>
+              </a:fillRef>
+              <a:effectRef idx="2">
+                <a:schemeClr val="accent1"/>
+              </a:effectRef>
+              <a:fontRef idx="minor">
+                <a:schemeClr val="lt1"/>
+              </a:fontRef>
+            </p:style>
+            <p:txBody>
+              <a:bodyPr rtlCol="0" anchor="ctr"/>
+              <a:lstStyle/>
+              <a:p>
+                <a:pPr algn="ctr"/>
+                <a:endParaRPr lang="de-DE"/>
+              </a:p>
+            </p:txBody>
+          </p:sp>
+          <p:sp>
+            <p:nvSpPr>
+              <p:cNvPr id="9" name="Parallelogramm 8"/>
+              <p:cNvSpPr/>
+              <p:nvPr/>
+            </p:nvSpPr>
+            <p:spPr>
+              <a:xfrm rot="19815425">
+                <a:off x="2958843" y="2991532"/>
+                <a:ext cx="2661645" cy="1543077"/>
+              </a:xfrm>
+              <a:prstGeom prst="parallelogram">
+                <a:avLst>
+                  <a:gd name="adj" fmla="val 57065"/>
+                </a:avLst>
+              </a:prstGeom>
+              <a:noFill/>
+              <a:ln w="19050" cmpd="sng">
+                <a:solidFill>
+                  <a:srgbClr val="333D47"/>
+                </a:solidFill>
+              </a:ln>
+            </p:spPr>
+            <p:style>
+              <a:lnRef idx="1">
+                <a:schemeClr val="accent1"/>
+              </a:lnRef>
+              <a:fillRef idx="3">
+                <a:schemeClr val="accent1"/>
+              </a:fillRef>
+              <a:effectRef idx="2">
+                <a:schemeClr val="accent1"/>
+              </a:effectRef>
+              <a:fontRef idx="minor">
+                <a:schemeClr val="lt1"/>
+              </a:fontRef>
+            </p:style>
+            <p:txBody>
+              <a:bodyPr rtlCol="0" anchor="ctr"/>
+              <a:lstStyle/>
+              <a:p>
+                <a:pPr algn="ctr"/>
+                <a:endParaRPr lang="de-DE"/>
+              </a:p>
+            </p:txBody>
+          </p:sp>
+          <p:sp>
+            <p:nvSpPr>
+              <p:cNvPr id="24" name="Gleichschenkliges Dreieck 23"/>
+              <p:cNvSpPr/>
+              <p:nvPr/>
+            </p:nvSpPr>
+            <p:spPr>
+              <a:xfrm rot="9018042">
+                <a:off x="2255324" y="1872714"/>
+                <a:ext cx="1762729" cy="1537984"/>
+              </a:xfrm>
+              <a:prstGeom prst="triangle">
+                <a:avLst>
+                  <a:gd name="adj" fmla="val 49958"/>
+                </a:avLst>
+              </a:prstGeom>
+              <a:noFill/>
+              <a:ln w="19050" cmpd="sng">
+                <a:solidFill>
+                  <a:srgbClr val="333D47"/>
+                </a:solidFill>
+              </a:ln>
+            </p:spPr>
+            <p:style>
+              <a:lnRef idx="1">
+                <a:schemeClr val="accent1"/>
+              </a:lnRef>
+              <a:fillRef idx="3">
+                <a:schemeClr val="accent1"/>
+              </a:fillRef>
+              <a:effectRef idx="2">
+                <a:schemeClr val="accent1"/>
+              </a:effectRef>
+              <a:fontRef idx="minor">
+                <a:schemeClr val="lt1"/>
+              </a:fontRef>
+            </p:style>
+            <p:txBody>
+              <a:bodyPr rtlCol="0" anchor="ctr"/>
+              <a:lstStyle/>
+              <a:p>
+                <a:pPr algn="ctr"/>
+                <a:endParaRPr lang="de-DE"/>
+              </a:p>
+            </p:txBody>
+          </p:sp>
+          <p:sp>
+            <p:nvSpPr>
+              <p:cNvPr id="25" name="Gleichschenkliges Dreieck 24"/>
+              <p:cNvSpPr/>
+              <p:nvPr/>
+            </p:nvSpPr>
+            <p:spPr>
+              <a:xfrm rot="9018042">
+                <a:off x="2248974" y="3654808"/>
+                <a:ext cx="1762729" cy="1537984"/>
+              </a:xfrm>
+              <a:prstGeom prst="triangle">
+                <a:avLst>
+                  <a:gd name="adj" fmla="val 49958"/>
+                </a:avLst>
+              </a:prstGeom>
+              <a:noFill/>
+              <a:ln w="19050" cmpd="sng">
+                <a:solidFill>
+                  <a:srgbClr val="333D47"/>
+                </a:solidFill>
+              </a:ln>
+            </p:spPr>
+            <p:style>
+              <a:lnRef idx="1">
+                <a:schemeClr val="accent1"/>
+              </a:lnRef>
+              <a:fillRef idx="3">
+                <a:schemeClr val="accent1"/>
+              </a:fillRef>
+              <a:effectRef idx="2">
+                <a:schemeClr val="accent1"/>
+              </a:effectRef>
+              <a:fontRef idx="minor">
+                <a:schemeClr val="lt1"/>
+              </a:fontRef>
+            </p:style>
+            <p:txBody>
+              <a:bodyPr rtlCol="0" anchor="ctr"/>
+              <a:lstStyle/>
+              <a:p>
+                <a:pPr algn="ctr"/>
+                <a:endParaRPr lang="de-DE"/>
+              </a:p>
+            </p:txBody>
+          </p:sp>
+        </p:grpSp>
+      </p:grpSp>
+    </p:spTree>
+    <p:extLst>
+      <p:ext uri="{BB962C8B-B14F-4D97-AF65-F5344CB8AC3E}">
+        <p14:creationId xmlns:p14="http://schemas.microsoft.com/office/powerpoint/2010/main" val="291301332"/>
+      </p:ext>
+    </p:extLst>
+  </p:cSld>
+  <p:clrMapOvr>
+    <a:masterClrMapping/>
+  </p:clrMapOvr>
+  <p:timing>
+    <p:tnLst>
+      <p:par>
+        <p:cTn xmlns:p14="http://schemas.microsoft.com/office/powerpoint/2010/main" id="1" dur="indefinite" restart="never" nodeType="tmRoot"/>
+      </p:par>
+    </p:tnLst>
+  </p:timing>
+</p:sld>
+</file>
+
+<file path=ppt/slides/slide4.xml><?xml version="1.0" encoding="utf-8"?>
+<p:sld xmlns:a="http://schemas.openxmlformats.org/drawingml/2006/main" xmlns:r="http://schemas.openxmlformats.org/officeDocument/2006/relationships" xmlns:p="http://schemas.openxmlformats.org/presentationml/2006/main">
+  <p:cSld>
+    <p:spTree>
+      <p:nvGrpSpPr>
+        <p:cNvPr id="1" name=""/>
+        <p:cNvGrpSpPr/>
+        <p:nvPr/>
+      </p:nvGrpSpPr>
+      <p:grpSpPr>
+        <a:xfrm>
+          <a:off x="0" y="0"/>
+          <a:ext cx="0" cy="0"/>
+          <a:chOff x="0" y="0"/>
+          <a:chExt cx="0" cy="0"/>
+        </a:xfrm>
+      </p:grpSpPr>
+      <p:sp>
+        <p:nvSpPr>
+          <p:cNvPr id="5" name="Rechteck 4"/>
+          <p:cNvSpPr/>
+          <p:nvPr/>
+        </p:nvSpPr>
+        <p:spPr>
+          <a:xfrm>
+            <a:off x="4233" y="-4233"/>
+            <a:ext cx="9144000" cy="6857999"/>
+          </a:xfrm>
+          <a:prstGeom prst="rect">
+            <a:avLst/>
+          </a:prstGeom>
+          <a:solidFill>
+            <a:srgbClr val="F3F3F4"/>
+          </a:solidFill>
+          <a:ln>
+            <a:noFill/>
+          </a:ln>
+        </p:spPr>
+        <p:style>
+          <a:lnRef idx="1">
+            <a:schemeClr val="accent1"/>
+          </a:lnRef>
+          <a:fillRef idx="3">
+            <a:schemeClr val="accent1"/>
+          </a:fillRef>
+          <a:effectRef idx="2">
+            <a:schemeClr val="accent1"/>
+          </a:effectRef>
+          <a:fontRef idx="minor">
+            <a:schemeClr val="lt1"/>
+          </a:fontRef>
+        </p:style>
+        <p:txBody>
+          <a:bodyPr rtlCol="0" anchor="ctr"/>
+          <a:lstStyle/>
+          <a:p>
+            <a:pPr algn="ctr"/>
+            <a:endParaRPr lang="de-DE" dirty="0"/>
+          </a:p>
+        </p:txBody>
+      </p:sp>
+      <p:grpSp>
+        <p:nvGrpSpPr>
+          <p:cNvPr id="2" name="Gruppierung 1"/>
+          <p:cNvGrpSpPr/>
+          <p:nvPr/>
+        </p:nvGrpSpPr>
+        <p:grpSpPr>
+          <a:xfrm>
+            <a:off x="1968665" y="1660969"/>
+            <a:ext cx="1355077" cy="1509792"/>
+            <a:chOff x="2248974" y="1436337"/>
+            <a:chExt cx="3371514" cy="3756455"/>
+          </a:xfrm>
+        </p:grpSpPr>
+        <p:sp>
+          <p:nvSpPr>
+            <p:cNvPr id="17" name="Gleichschenkliges Dreieck 16"/>
+            <p:cNvSpPr/>
+            <p:nvPr/>
+          </p:nvSpPr>
+          <p:spPr>
+            <a:xfrm rot="19815544">
+              <a:off x="3015709" y="1436337"/>
+              <a:ext cx="1778053" cy="1537984"/>
+            </a:xfrm>
+            <a:prstGeom prst="triangle">
+              <a:avLst>
+                <a:gd name="adj" fmla="val 49958"/>
+              </a:avLst>
+            </a:prstGeom>
+            <a:noFill/>
+            <a:ln w="19050" cmpd="sng">
+              <a:solidFill>
+                <a:srgbClr val="333D47"/>
+              </a:solidFill>
+            </a:ln>
+          </p:spPr>
+          <p:style>
+            <a:lnRef idx="1">
+              <a:schemeClr val="accent1"/>
+            </a:lnRef>
+            <a:fillRef idx="3">
+              <a:schemeClr val="accent1"/>
+            </a:fillRef>
+            <a:effectRef idx="2">
+              <a:schemeClr val="accent1"/>
+            </a:effectRef>
+            <a:fontRef idx="minor">
+              <a:schemeClr val="lt1"/>
+            </a:fontRef>
+          </p:style>
+          <p:txBody>
+            <a:bodyPr rtlCol="0" anchor="ctr"/>
+            <a:lstStyle/>
+            <a:p>
+              <a:pPr algn="ctr"/>
+              <a:endParaRPr lang="de-DE"/>
+            </a:p>
+          </p:txBody>
+        </p:sp>
+        <p:sp>
+          <p:nvSpPr>
+            <p:cNvPr id="9" name="Parallelogramm 8"/>
+            <p:cNvSpPr/>
+            <p:nvPr/>
+          </p:nvSpPr>
+          <p:spPr>
+            <a:xfrm rot="19815425">
+              <a:off x="2958843" y="2991532"/>
+              <a:ext cx="2661645" cy="1543077"/>
+            </a:xfrm>
+            <a:prstGeom prst="parallelogram">
+              <a:avLst>
+                <a:gd name="adj" fmla="val 57065"/>
+              </a:avLst>
+            </a:prstGeom>
+            <a:noFill/>
+            <a:ln w="19050" cmpd="sng">
+              <a:solidFill>
+                <a:srgbClr val="333D47"/>
+              </a:solidFill>
+            </a:ln>
+          </p:spPr>
+          <p:style>
+            <a:lnRef idx="1">
+              <a:schemeClr val="accent1"/>
+            </a:lnRef>
+            <a:fillRef idx="3">
+              <a:schemeClr val="accent1"/>
+            </a:fillRef>
+            <a:effectRef idx="2">
+              <a:schemeClr val="accent1"/>
+            </a:effectRef>
+            <a:fontRef idx="minor">
+              <a:schemeClr val="lt1"/>
+            </a:fontRef>
+          </p:style>
+          <p:txBody>
+            <a:bodyPr rtlCol="0" anchor="ctr"/>
+            <a:lstStyle/>
+            <a:p>
+              <a:pPr algn="ctr"/>
+              <a:endParaRPr lang="de-DE"/>
+            </a:p>
+          </p:txBody>
+        </p:sp>
+        <p:sp>
+          <p:nvSpPr>
+            <p:cNvPr id="24" name="Gleichschenkliges Dreieck 23"/>
+            <p:cNvSpPr/>
+            <p:nvPr/>
+          </p:nvSpPr>
+          <p:spPr>
+            <a:xfrm rot="9018042">
+              <a:off x="2255324" y="1872714"/>
+              <a:ext cx="1762729" cy="1537984"/>
+            </a:xfrm>
+            <a:prstGeom prst="triangle">
+              <a:avLst>
+                <a:gd name="adj" fmla="val 49958"/>
+              </a:avLst>
+            </a:prstGeom>
+            <a:noFill/>
+            <a:ln w="19050" cmpd="sng">
+              <a:solidFill>
+                <a:srgbClr val="333D47"/>
+              </a:solidFill>
+            </a:ln>
+          </p:spPr>
+          <p:style>
+            <a:lnRef idx="1">
+              <a:schemeClr val="accent1"/>
+            </a:lnRef>
+            <a:fillRef idx="3">
+              <a:schemeClr val="accent1"/>
+            </a:fillRef>
+            <a:effectRef idx="2">
+              <a:schemeClr val="accent1"/>
+            </a:effectRef>
+            <a:fontRef idx="minor">
+              <a:schemeClr val="lt1"/>
+            </a:fontRef>
+          </p:style>
+          <p:txBody>
+            <a:bodyPr rtlCol="0" anchor="ctr"/>
+            <a:lstStyle/>
+            <a:p>
+              <a:pPr algn="ctr"/>
+              <a:endParaRPr lang="de-DE"/>
+            </a:p>
+          </p:txBody>
+        </p:sp>
+        <p:sp>
+          <p:nvSpPr>
+            <p:cNvPr id="25" name="Gleichschenkliges Dreieck 24"/>
+            <p:cNvSpPr/>
+            <p:nvPr/>
+          </p:nvSpPr>
+          <p:spPr>
+            <a:xfrm rot="9018042">
+              <a:off x="2248974" y="3654808"/>
+              <a:ext cx="1762729" cy="1537984"/>
+            </a:xfrm>
+            <a:prstGeom prst="triangle">
+              <a:avLst>
+                <a:gd name="adj" fmla="val 49958"/>
+              </a:avLst>
+            </a:prstGeom>
+            <a:noFill/>
+            <a:ln w="19050" cmpd="sng">
+              <a:solidFill>
+                <a:srgbClr val="333D47"/>
+              </a:solidFill>
+            </a:ln>
+          </p:spPr>
+          <p:style>
+            <a:lnRef idx="1">
+              <a:schemeClr val="accent1"/>
+            </a:lnRef>
+            <a:fillRef idx="3">
+              <a:schemeClr val="accent1"/>
+            </a:fillRef>
+            <a:effectRef idx="2">
+              <a:schemeClr val="accent1"/>
+            </a:effectRef>
+            <a:fontRef idx="minor">
+              <a:schemeClr val="lt1"/>
+            </a:fontRef>
+          </p:style>
+          <p:txBody>
+            <a:bodyPr rtlCol="0" anchor="ctr"/>
+            <a:lstStyle/>
+            <a:p>
+              <a:pPr algn="ctr"/>
+              <a:endParaRPr lang="de-DE"/>
+            </a:p>
+          </p:txBody>
+        </p:sp>
+      </p:grpSp>
+    </p:spTree>
+    <p:extLst>
+      <p:ext uri="{BB962C8B-B14F-4D97-AF65-F5344CB8AC3E}">
+        <p14:creationId xmlns:p14="http://schemas.microsoft.com/office/powerpoint/2010/main" val="525292348"/>
       </p:ext>
     </p:extLst>
   </p:cSld>

</xml_diff>